<commit_message>
03.22 1차 Interim 제출 파일 v1.1
1차 interim 제출 파일
v1.0 대비 큰 차이는 없다. (말을 좀 다듬은 정도)
</commit_message>
<xml_diff>
--- a/AA/인증과제_ppt자료.pptx
+++ b/AA/인증과제_ppt자료.pptx
@@ -260,7 +260,7 @@
           <a:p>
             <a:fld id="{7FD4DF60-5030-440F-BF31-F2EDE67656D5}" type="datetimeFigureOut">
               <a:rPr lang="ko-KR" altLang="en-US" smtClean="0"/>
-              <a:t>2021-03-21</a:t>
+              <a:t>2021-03-22</a:t>
             </a:fld>
             <a:endParaRPr lang="ko-KR" altLang="en-US"/>
           </a:p>
@@ -458,7 +458,7 @@
           <a:p>
             <a:fld id="{7FD4DF60-5030-440F-BF31-F2EDE67656D5}" type="datetimeFigureOut">
               <a:rPr lang="ko-KR" altLang="en-US" smtClean="0"/>
-              <a:t>2021-03-21</a:t>
+              <a:t>2021-03-22</a:t>
             </a:fld>
             <a:endParaRPr lang="ko-KR" altLang="en-US"/>
           </a:p>
@@ -666,7 +666,7 @@
           <a:p>
             <a:fld id="{7FD4DF60-5030-440F-BF31-F2EDE67656D5}" type="datetimeFigureOut">
               <a:rPr lang="ko-KR" altLang="en-US" smtClean="0"/>
-              <a:t>2021-03-21</a:t>
+              <a:t>2021-03-22</a:t>
             </a:fld>
             <a:endParaRPr lang="ko-KR" altLang="en-US"/>
           </a:p>
@@ -864,7 +864,7 @@
           <a:p>
             <a:fld id="{7FD4DF60-5030-440F-BF31-F2EDE67656D5}" type="datetimeFigureOut">
               <a:rPr lang="ko-KR" altLang="en-US" smtClean="0"/>
-              <a:t>2021-03-21</a:t>
+              <a:t>2021-03-22</a:t>
             </a:fld>
             <a:endParaRPr lang="ko-KR" altLang="en-US"/>
           </a:p>
@@ -1139,7 +1139,7 @@
           <a:p>
             <a:fld id="{7FD4DF60-5030-440F-BF31-F2EDE67656D5}" type="datetimeFigureOut">
               <a:rPr lang="ko-KR" altLang="en-US" smtClean="0"/>
-              <a:t>2021-03-21</a:t>
+              <a:t>2021-03-22</a:t>
             </a:fld>
             <a:endParaRPr lang="ko-KR" altLang="en-US"/>
           </a:p>
@@ -1404,7 +1404,7 @@
           <a:p>
             <a:fld id="{7FD4DF60-5030-440F-BF31-F2EDE67656D5}" type="datetimeFigureOut">
               <a:rPr lang="ko-KR" altLang="en-US" smtClean="0"/>
-              <a:t>2021-03-21</a:t>
+              <a:t>2021-03-22</a:t>
             </a:fld>
             <a:endParaRPr lang="ko-KR" altLang="en-US"/>
           </a:p>
@@ -1816,7 +1816,7 @@
           <a:p>
             <a:fld id="{7FD4DF60-5030-440F-BF31-F2EDE67656D5}" type="datetimeFigureOut">
               <a:rPr lang="ko-KR" altLang="en-US" smtClean="0"/>
-              <a:t>2021-03-21</a:t>
+              <a:t>2021-03-22</a:t>
             </a:fld>
             <a:endParaRPr lang="ko-KR" altLang="en-US"/>
           </a:p>
@@ -1957,7 +1957,7 @@
           <a:p>
             <a:fld id="{7FD4DF60-5030-440F-BF31-F2EDE67656D5}" type="datetimeFigureOut">
               <a:rPr lang="ko-KR" altLang="en-US" smtClean="0"/>
-              <a:t>2021-03-21</a:t>
+              <a:t>2021-03-22</a:t>
             </a:fld>
             <a:endParaRPr lang="ko-KR" altLang="en-US"/>
           </a:p>
@@ -2070,7 +2070,7 @@
           <a:p>
             <a:fld id="{7FD4DF60-5030-440F-BF31-F2EDE67656D5}" type="datetimeFigureOut">
               <a:rPr lang="ko-KR" altLang="en-US" smtClean="0"/>
-              <a:t>2021-03-21</a:t>
+              <a:t>2021-03-22</a:t>
             </a:fld>
             <a:endParaRPr lang="ko-KR" altLang="en-US"/>
           </a:p>
@@ -2381,7 +2381,7 @@
           <a:p>
             <a:fld id="{7FD4DF60-5030-440F-BF31-F2EDE67656D5}" type="datetimeFigureOut">
               <a:rPr lang="ko-KR" altLang="en-US" smtClean="0"/>
-              <a:t>2021-03-21</a:t>
+              <a:t>2021-03-22</a:t>
             </a:fld>
             <a:endParaRPr lang="ko-KR" altLang="en-US"/>
           </a:p>
@@ -2669,7 +2669,7 @@
           <a:p>
             <a:fld id="{7FD4DF60-5030-440F-BF31-F2EDE67656D5}" type="datetimeFigureOut">
               <a:rPr lang="ko-KR" altLang="en-US" smtClean="0"/>
-              <a:t>2021-03-21</a:t>
+              <a:t>2021-03-22</a:t>
             </a:fld>
             <a:endParaRPr lang="ko-KR" altLang="en-US"/>
           </a:p>
@@ -2910,7 +2910,7 @@
           <a:p>
             <a:fld id="{7FD4DF60-5030-440F-BF31-F2EDE67656D5}" type="datetimeFigureOut">
               <a:rPr lang="ko-KR" altLang="en-US" smtClean="0"/>
-              <a:t>2021-03-21</a:t>
+              <a:t>2021-03-22</a:t>
             </a:fld>
             <a:endParaRPr lang="ko-KR" altLang="en-US"/>
           </a:p>
@@ -3342,7 +3342,7 @@
         <p:spPr>
           <a:xfrm>
             <a:off x="4051883" y="2080470"/>
-            <a:ext cx="2508308" cy="1199625"/>
+            <a:ext cx="2044117" cy="1216403"/>
           </a:xfrm>
           <a:prstGeom prst="rect">
             <a:avLst/>
@@ -3385,8 +3385,8 @@
         </p:nvSpPr>
         <p:spPr>
           <a:xfrm rot="10800000" flipH="1">
-            <a:off x="4051882" y="2080469"/>
-            <a:ext cx="1820411" cy="369115"/>
+            <a:off x="4051883" y="2080468"/>
+            <a:ext cx="1396898" cy="369115"/>
           </a:xfrm>
           <a:prstGeom prst="snip1Rect">
             <a:avLst/>
@@ -3429,8 +3429,8 @@
         </p:nvSpPr>
         <p:spPr>
           <a:xfrm>
-            <a:off x="4224000" y="2111138"/>
-            <a:ext cx="1476173" cy="307777"/>
+            <a:off x="4156888" y="2111138"/>
+            <a:ext cx="1291892" cy="276999"/>
           </a:xfrm>
           <a:prstGeom prst="rect">
             <a:avLst/>
@@ -3444,18 +3444,18 @@
           <a:lstStyle/>
           <a:p>
             <a:r>
-              <a:rPr lang="en-US" altLang="ko-KR" sz="1400" dirty="0"/>
+              <a:rPr lang="en-US" altLang="ko-KR" sz="1200" dirty="0"/>
               <a:t>ADL</a:t>
             </a:r>
             <a:r>
-              <a:rPr lang="ko-KR" altLang="en-US" sz="1400" dirty="0"/>
+              <a:rPr lang="ko-KR" altLang="en-US" sz="1200" dirty="0"/>
               <a:t> </a:t>
             </a:r>
             <a:r>
-              <a:rPr lang="en-US" altLang="ko-KR" sz="1400" dirty="0"/>
+              <a:rPr lang="en-US" altLang="ko-KR" sz="1200" dirty="0"/>
               <a:t>Framework</a:t>
             </a:r>
-            <a:endParaRPr lang="ko-KR" altLang="en-US" sz="1400" dirty="0"/>
+            <a:endParaRPr lang="ko-KR" altLang="en-US" sz="1200" dirty="0"/>
           </a:p>
         </p:txBody>
       </p:sp>
@@ -3473,7 +3473,7 @@
         </p:nvSpPr>
         <p:spPr>
           <a:xfrm>
-            <a:off x="3215786" y="2583861"/>
+            <a:off x="3315321" y="2660805"/>
             <a:ext cx="192842" cy="192842"/>
           </a:xfrm>
           <a:prstGeom prst="ellipse">
@@ -3513,15 +3513,16 @@
             </a:extLst>
           </p:cNvPr>
           <p:cNvCxnSpPr>
+            <a:cxnSpLocks/>
             <a:stCxn id="9" idx="6"/>
-            <a:endCxn id="5" idx="1"/>
+            <a:endCxn id="22" idx="1"/>
           </p:cNvCxnSpPr>
           <p:nvPr/>
         </p:nvCxnSpPr>
         <p:spPr>
           <a:xfrm>
-            <a:off x="3408628" y="2680282"/>
-            <a:ext cx="643255" cy="1"/>
+            <a:off x="3508163" y="2757226"/>
+            <a:ext cx="466937" cy="0"/>
           </a:xfrm>
           <a:prstGeom prst="line">
             <a:avLst/>
@@ -3542,258 +3543,95 @@
           </a:fontRef>
         </p:style>
       </p:cxnSp>
-      <p:grpSp>
-        <p:nvGrpSpPr>
-          <p:cNvPr id="24" name="그룹 23">
-            <a:extLst>
-              <a:ext uri="{FF2B5EF4-FFF2-40B4-BE49-F238E27FC236}">
-                <a16:creationId xmlns:a16="http://schemas.microsoft.com/office/drawing/2014/main" id="{FBFC32CF-022E-4DD3-8E41-89FDEA630821}"/>
-              </a:ext>
-            </a:extLst>
-          </p:cNvPr>
-          <p:cNvGrpSpPr/>
+      <p:sp>
+        <p:nvSpPr>
+          <p:cNvPr id="29" name="TextBox 28">
+            <a:extLst>
+              <a:ext uri="{FF2B5EF4-FFF2-40B4-BE49-F238E27FC236}">
+                <a16:creationId xmlns:a16="http://schemas.microsoft.com/office/drawing/2014/main" id="{7BF6B5AD-6049-4866-A312-6D615AC5DCEF}"/>
+              </a:ext>
+            </a:extLst>
+          </p:cNvPr>
+          <p:cNvSpPr txBox="1"/>
           <p:nvPr/>
-        </p:nvGrpSpPr>
-        <p:grpSpPr>
+        </p:nvSpPr>
+        <p:spPr>
           <a:xfrm>
-            <a:off x="2348444" y="2265026"/>
-            <a:ext cx="796757" cy="1292425"/>
-            <a:chOff x="1929566" y="2136575"/>
-            <a:chExt cx="796757" cy="1292425"/>
-          </a:xfrm>
-        </p:grpSpPr>
-        <p:sp>
-          <p:nvSpPr>
-            <p:cNvPr id="12" name="타원 11">
-              <a:extLst>
-                <a:ext uri="{FF2B5EF4-FFF2-40B4-BE49-F238E27FC236}">
-                  <a16:creationId xmlns:a16="http://schemas.microsoft.com/office/drawing/2014/main" id="{BB34FA4C-EA95-4D48-B70D-5D69244114FE}"/>
-                </a:ext>
-              </a:extLst>
-            </p:cNvPr>
-            <p:cNvSpPr/>
-            <p:nvPr/>
-          </p:nvSpPr>
-          <p:spPr>
-            <a:xfrm>
-              <a:off x="2190923" y="2136575"/>
-              <a:ext cx="282340" cy="282340"/>
-            </a:xfrm>
-            <a:prstGeom prst="ellipse">
-              <a:avLst/>
-            </a:prstGeom>
-            <a:ln w="9525"/>
-          </p:spPr>
-          <p:style>
-            <a:lnRef idx="2">
-              <a:schemeClr val="dk1"/>
-            </a:lnRef>
-            <a:fillRef idx="1">
-              <a:schemeClr val="lt1"/>
-            </a:fillRef>
-            <a:effectRef idx="0">
-              <a:schemeClr val="dk1"/>
-            </a:effectRef>
-            <a:fontRef idx="minor">
-              <a:schemeClr val="dk1"/>
-            </a:fontRef>
-          </p:style>
-          <p:txBody>
-            <a:bodyPr rtlCol="0" anchor="ctr"/>
-            <a:lstStyle/>
-            <a:p>
-              <a:pPr algn="ctr"/>
-              <a:endParaRPr lang="ko-KR" altLang="en-US"/>
-            </a:p>
-          </p:txBody>
-        </p:sp>
-        <p:cxnSp>
-          <p:nvCxnSpPr>
-            <p:cNvPr id="14" name="직선 연결선 13">
-              <a:extLst>
-                <a:ext uri="{FF2B5EF4-FFF2-40B4-BE49-F238E27FC236}">
-                  <a16:creationId xmlns:a16="http://schemas.microsoft.com/office/drawing/2014/main" id="{497F0F78-F22D-43E2-9208-43D79D30D7A5}"/>
-                </a:ext>
-              </a:extLst>
-            </p:cNvPr>
-            <p:cNvCxnSpPr>
-              <a:stCxn id="12" idx="4"/>
-            </p:cNvCxnSpPr>
-            <p:nvPr/>
-          </p:nvCxnSpPr>
-          <p:spPr>
-            <a:xfrm>
-              <a:off x="2332093" y="2418915"/>
-              <a:ext cx="0" cy="475287"/>
-            </a:xfrm>
-            <a:prstGeom prst="line">
-              <a:avLst/>
-            </a:prstGeom>
-          </p:spPr>
-          <p:style>
-            <a:lnRef idx="1">
-              <a:schemeClr val="dk1"/>
-            </a:lnRef>
-            <a:fillRef idx="0">
-              <a:schemeClr val="dk1"/>
-            </a:fillRef>
-            <a:effectRef idx="0">
-              <a:schemeClr val="dk1"/>
-            </a:effectRef>
-            <a:fontRef idx="minor">
+            <a:off x="2645441" y="2625673"/>
+            <a:ext cx="641825" cy="276999"/>
+          </a:xfrm>
+          <a:prstGeom prst="rect">
+            <a:avLst/>
+          </a:prstGeom>
+          <a:noFill/>
+        </p:spPr>
+        <p:txBody>
+          <a:bodyPr wrap="square" rtlCol="0">
+            <a:spAutoFit/>
+          </a:bodyPr>
+          <a:lstStyle/>
+          <a:p>
+            <a:r>
+              <a:rPr lang="ko-KR" altLang="en-US" sz="1200" dirty="0"/>
+              <a:t>사용자</a:t>
+            </a:r>
+          </a:p>
+        </p:txBody>
+      </p:sp>
+      <p:sp>
+        <p:nvSpPr>
+          <p:cNvPr id="22" name="직사각형 21">
+            <a:extLst>
+              <a:ext uri="{FF2B5EF4-FFF2-40B4-BE49-F238E27FC236}">
+                <a16:creationId xmlns:a16="http://schemas.microsoft.com/office/drawing/2014/main" id="{36DA6104-5927-4077-A12C-26526A5D5482}"/>
+              </a:ext>
+            </a:extLst>
+          </p:cNvPr>
+          <p:cNvSpPr/>
+          <p:nvPr/>
+        </p:nvSpPr>
+        <p:spPr>
+          <a:xfrm>
+            <a:off x="3975100" y="2680444"/>
+            <a:ext cx="153564" cy="153564"/>
+          </a:xfrm>
+          <a:prstGeom prst="rect">
+            <a:avLst/>
+          </a:prstGeom>
+          <a:solidFill>
+            <a:schemeClr val="bg1"/>
+          </a:solidFill>
+          <a:ln>
+            <a:solidFill>
               <a:schemeClr val="tx1"/>
-            </a:fontRef>
-          </p:style>
-        </p:cxnSp>
-        <p:cxnSp>
-          <p:nvCxnSpPr>
-            <p:cNvPr id="15" name="직선 연결선 14">
-              <a:extLst>
-                <a:ext uri="{FF2B5EF4-FFF2-40B4-BE49-F238E27FC236}">
-                  <a16:creationId xmlns:a16="http://schemas.microsoft.com/office/drawing/2014/main" id="{752A1FA1-5EFA-4E31-B13E-F164DA8CE5DC}"/>
-                </a:ext>
-              </a:extLst>
-            </p:cNvPr>
-            <p:cNvCxnSpPr>
-              <a:cxnSpLocks/>
-            </p:cNvCxnSpPr>
-            <p:nvPr/>
-          </p:nvCxnSpPr>
-          <p:spPr>
-            <a:xfrm flipH="1">
-              <a:off x="2114026" y="2894202"/>
-              <a:ext cx="218068" cy="141170"/>
-            </a:xfrm>
-            <a:prstGeom prst="line">
-              <a:avLst/>
-            </a:prstGeom>
-          </p:spPr>
-          <p:style>
-            <a:lnRef idx="1">
-              <a:schemeClr val="dk1"/>
-            </a:lnRef>
-            <a:fillRef idx="0">
-              <a:schemeClr val="dk1"/>
-            </a:fillRef>
-            <a:effectRef idx="0">
-              <a:schemeClr val="dk1"/>
-            </a:effectRef>
-            <a:fontRef idx="minor">
-              <a:schemeClr val="tx1"/>
-            </a:fontRef>
-          </p:style>
-        </p:cxnSp>
-        <p:cxnSp>
-          <p:nvCxnSpPr>
-            <p:cNvPr id="21" name="직선 연결선 20">
-              <a:extLst>
-                <a:ext uri="{FF2B5EF4-FFF2-40B4-BE49-F238E27FC236}">
-                  <a16:creationId xmlns:a16="http://schemas.microsoft.com/office/drawing/2014/main" id="{29810759-6496-422D-9DD9-C14C5F3C4078}"/>
-                </a:ext>
-              </a:extLst>
-            </p:cNvPr>
-            <p:cNvCxnSpPr>
-              <a:cxnSpLocks/>
-            </p:cNvCxnSpPr>
-            <p:nvPr/>
-          </p:nvCxnSpPr>
-          <p:spPr>
-            <a:xfrm>
-              <a:off x="2332093" y="2894202"/>
-              <a:ext cx="218068" cy="141170"/>
-            </a:xfrm>
-            <a:prstGeom prst="line">
-              <a:avLst/>
-            </a:prstGeom>
-          </p:spPr>
-          <p:style>
-            <a:lnRef idx="1">
-              <a:schemeClr val="dk1"/>
-            </a:lnRef>
-            <a:fillRef idx="0">
-              <a:schemeClr val="dk1"/>
-            </a:fillRef>
-            <a:effectRef idx="0">
-              <a:schemeClr val="dk1"/>
-            </a:effectRef>
-            <a:fontRef idx="minor">
-              <a:schemeClr val="tx1"/>
-            </a:fontRef>
-          </p:style>
-        </p:cxnSp>
-        <p:cxnSp>
-          <p:nvCxnSpPr>
-            <p:cNvPr id="26" name="직선 연결선 25">
-              <a:extLst>
-                <a:ext uri="{FF2B5EF4-FFF2-40B4-BE49-F238E27FC236}">
-                  <a16:creationId xmlns:a16="http://schemas.microsoft.com/office/drawing/2014/main" id="{2CD2A931-22C7-4227-95B0-F92949EE3474}"/>
-                </a:ext>
-              </a:extLst>
-            </p:cNvPr>
-            <p:cNvCxnSpPr/>
-            <p:nvPr/>
-          </p:nvCxnSpPr>
-          <p:spPr>
-            <a:xfrm>
-              <a:off x="2030136" y="2539112"/>
-              <a:ext cx="595618" cy="0"/>
-            </a:xfrm>
-            <a:prstGeom prst="line">
-              <a:avLst/>
-            </a:prstGeom>
-          </p:spPr>
-          <p:style>
-            <a:lnRef idx="1">
-              <a:schemeClr val="dk1"/>
-            </a:lnRef>
-            <a:fillRef idx="0">
-              <a:schemeClr val="dk1"/>
-            </a:fillRef>
-            <a:effectRef idx="0">
-              <a:schemeClr val="dk1"/>
-            </a:effectRef>
-            <a:fontRef idx="minor">
-              <a:schemeClr val="tx1"/>
-            </a:fontRef>
-          </p:style>
-        </p:cxnSp>
-        <p:sp>
-          <p:nvSpPr>
-            <p:cNvPr id="29" name="TextBox 28">
-              <a:extLst>
-                <a:ext uri="{FF2B5EF4-FFF2-40B4-BE49-F238E27FC236}">
-                  <a16:creationId xmlns:a16="http://schemas.microsoft.com/office/drawing/2014/main" id="{7BF6B5AD-6049-4866-A312-6D615AC5DCEF}"/>
-                </a:ext>
-              </a:extLst>
-            </p:cNvPr>
-            <p:cNvSpPr txBox="1"/>
-            <p:nvPr/>
-          </p:nvSpPr>
-          <p:spPr>
-            <a:xfrm>
-              <a:off x="1929566" y="3152001"/>
-              <a:ext cx="796757" cy="276999"/>
-            </a:xfrm>
-            <a:prstGeom prst="rect">
-              <a:avLst/>
-            </a:prstGeom>
-            <a:noFill/>
-          </p:spPr>
-          <p:txBody>
-            <a:bodyPr wrap="none" rtlCol="0">
-              <a:spAutoFit/>
-            </a:bodyPr>
-            <a:lstStyle/>
-            <a:p>
-              <a:r>
-                <a:rPr lang="en-US" altLang="ko-KR" sz="1200" dirty="0"/>
-                <a:t>Architect</a:t>
-              </a:r>
-              <a:endParaRPr lang="ko-KR" altLang="en-US" sz="1200" dirty="0"/>
-            </a:p>
-          </p:txBody>
-        </p:sp>
-      </p:grpSp>
+            </a:solidFill>
+          </a:ln>
+        </p:spPr>
+        <p:style>
+          <a:lnRef idx="2">
+            <a:schemeClr val="accent1">
+              <a:shade val="50000"/>
+            </a:schemeClr>
+          </a:lnRef>
+          <a:fillRef idx="1">
+            <a:schemeClr val="accent1"/>
+          </a:fillRef>
+          <a:effectRef idx="0">
+            <a:schemeClr val="accent1"/>
+          </a:effectRef>
+          <a:fontRef idx="minor">
+            <a:schemeClr val="lt1"/>
+          </a:fontRef>
+        </p:style>
+        <p:txBody>
+          <a:bodyPr rtlCol="0" anchor="ctr"/>
+          <a:lstStyle/>
+          <a:p>
+            <a:pPr algn="ctr"/>
+            <a:endParaRPr lang="ko-KR" altLang="en-US"/>
+          </a:p>
+        </p:txBody>
+      </p:sp>
       <p:cxnSp>
         <p:nvCxnSpPr>
           <p:cNvPr id="13" name="직선 연결선 12">
@@ -3805,14 +3643,14 @@
           </p:cNvPr>
           <p:cNvCxnSpPr>
             <a:cxnSpLocks/>
-            <a:endCxn id="5" idx="2"/>
+            <a:endCxn id="27" idx="2"/>
           </p:cNvCxnSpPr>
           <p:nvPr/>
         </p:nvCxnSpPr>
         <p:spPr>
-          <a:xfrm flipV="1">
-            <a:off x="5306037" y="3280095"/>
-            <a:ext cx="0" cy="444617"/>
+          <a:xfrm flipH="1">
+            <a:off x="6172783" y="2775422"/>
+            <a:ext cx="360724" cy="0"/>
           </a:xfrm>
           <a:prstGeom prst="line">
             <a:avLst/>
@@ -3846,9 +3684,9 @@
           <p:nvPr/>
         </p:nvSpPr>
         <p:spPr>
-          <a:xfrm>
-            <a:off x="5164867" y="3724712"/>
-            <a:ext cx="282340" cy="282340"/>
+          <a:xfrm rot="16200000">
+            <a:off x="6533506" y="2672889"/>
+            <a:ext cx="192842" cy="192842"/>
           </a:xfrm>
           <a:prstGeom prst="ellipse">
             <a:avLst/>
@@ -3890,9 +3728,9 @@
           <p:nvPr/>
         </p:nvSpPr>
         <p:spPr>
-          <a:xfrm>
-            <a:off x="4940535" y="3830927"/>
-            <a:ext cx="743436" cy="310574"/>
+          <a:xfrm rot="16200000">
+            <a:off x="6653837" y="2620133"/>
+            <a:ext cx="282341" cy="310574"/>
           </a:xfrm>
           <a:prstGeom prst="rect">
             <a:avLst/>
@@ -3925,16 +3763,16 @@
           <a:lstStyle/>
           <a:p>
             <a:pPr algn="ctr"/>
-            <a:endParaRPr lang="ko-KR" altLang="en-US"/>
-          </a:p>
-        </p:txBody>
-      </p:sp>
-      <p:sp>
-        <p:nvSpPr>
-          <p:cNvPr id="10" name="구름 9">
-            <a:extLst>
-              <a:ext uri="{FF2B5EF4-FFF2-40B4-BE49-F238E27FC236}">
-                <a16:creationId xmlns:a16="http://schemas.microsoft.com/office/drawing/2014/main" id="{197DACE2-335B-404C-AD94-E50D7FC8B514}"/>
+            <a:endParaRPr lang="ko-KR" altLang="en-US" dirty="0"/>
+          </a:p>
+        </p:txBody>
+      </p:sp>
+      <p:sp>
+        <p:nvSpPr>
+          <p:cNvPr id="27" name="직사각형 26">
+            <a:extLst>
+              <a:ext uri="{FF2B5EF4-FFF2-40B4-BE49-F238E27FC236}">
+                <a16:creationId xmlns:a16="http://schemas.microsoft.com/office/drawing/2014/main" id="{1B715DD1-4B34-4C3C-891F-634FF5C0983C}"/>
               </a:ext>
             </a:extLst>
           </p:cNvPr>
@@ -3942,169 +3780,8 @@
           <p:nvPr/>
         </p:nvSpPr>
         <p:spPr>
-          <a:xfrm>
-            <a:off x="4261607" y="4172215"/>
-            <a:ext cx="2088859" cy="749281"/>
-          </a:xfrm>
-          <a:prstGeom prst="cloud">
-            <a:avLst/>
-          </a:prstGeom>
-          <a:solidFill>
-            <a:schemeClr val="bg1"/>
-          </a:solidFill>
-          <a:ln>
-            <a:solidFill>
-              <a:schemeClr val="tx1"/>
-            </a:solidFill>
-          </a:ln>
-        </p:spPr>
-        <p:style>
-          <a:lnRef idx="2">
-            <a:schemeClr val="accent1">
-              <a:shade val="50000"/>
-            </a:schemeClr>
-          </a:lnRef>
-          <a:fillRef idx="1">
-            <a:schemeClr val="accent1"/>
-          </a:fillRef>
-          <a:effectRef idx="0">
-            <a:schemeClr val="accent1"/>
-          </a:effectRef>
-          <a:fontRef idx="minor">
-            <a:schemeClr val="lt1"/>
-          </a:fontRef>
-        </p:style>
-        <p:txBody>
-          <a:bodyPr rtlCol="0" anchor="ctr"/>
-          <a:lstStyle/>
-          <a:p>
-            <a:pPr algn="ctr"/>
-            <a:r>
-              <a:rPr lang="en-US" altLang="ko-KR" sz="1400" dirty="0">
-                <a:solidFill>
-                  <a:schemeClr val="tx1"/>
-                </a:solidFill>
-              </a:rPr>
-              <a:t>Data</a:t>
-            </a:r>
-            <a:r>
-              <a:rPr lang="ko-KR" altLang="en-US" sz="1400" dirty="0">
-                <a:solidFill>
-                  <a:schemeClr val="tx1"/>
-                </a:solidFill>
-              </a:rPr>
-              <a:t> </a:t>
-            </a:r>
-            <a:r>
-              <a:rPr lang="en-US" altLang="ko-KR" sz="1400" dirty="0">
-                <a:solidFill>
-                  <a:schemeClr val="tx1"/>
-                </a:solidFill>
-              </a:rPr>
-              <a:t>Server</a:t>
-            </a:r>
-          </a:p>
-        </p:txBody>
-      </p:sp>
-      <p:cxnSp>
-        <p:nvCxnSpPr>
-          <p:cNvPr id="20" name="직선 연결선 19">
-            <a:extLst>
-              <a:ext uri="{FF2B5EF4-FFF2-40B4-BE49-F238E27FC236}">
-                <a16:creationId xmlns:a16="http://schemas.microsoft.com/office/drawing/2014/main" id="{31E71D7B-0BF9-45C1-9B5E-4722D37F9248}"/>
-              </a:ext>
-            </a:extLst>
-          </p:cNvPr>
-          <p:cNvCxnSpPr>
-            <a:cxnSpLocks/>
-            <a:stCxn id="10" idx="3"/>
-            <a:endCxn id="23" idx="4"/>
-          </p:cNvCxnSpPr>
-          <p:nvPr/>
-        </p:nvCxnSpPr>
-        <p:spPr>
-          <a:xfrm flipV="1">
-            <a:off x="5306037" y="4007134"/>
-            <a:ext cx="4194" cy="207922"/>
-          </a:xfrm>
-          <a:prstGeom prst="line">
-            <a:avLst/>
-          </a:prstGeom>
-        </p:spPr>
-        <p:style>
-          <a:lnRef idx="1">
-            <a:schemeClr val="dk1"/>
-          </a:lnRef>
-          <a:fillRef idx="0">
-            <a:schemeClr val="dk1"/>
-          </a:fillRef>
-          <a:effectRef idx="0">
-            <a:schemeClr val="dk1"/>
-          </a:effectRef>
-          <a:fontRef idx="minor">
-            <a:schemeClr val="tx1"/>
-          </a:fontRef>
-        </p:style>
-      </p:cxnSp>
-      <p:sp>
-        <p:nvSpPr>
-          <p:cNvPr id="23" name="타원 22">
-            <a:extLst>
-              <a:ext uri="{FF2B5EF4-FFF2-40B4-BE49-F238E27FC236}">
-                <a16:creationId xmlns:a16="http://schemas.microsoft.com/office/drawing/2014/main" id="{5DDD92C5-8272-4FD0-BF78-2A279FC84A9D}"/>
-              </a:ext>
-            </a:extLst>
-          </p:cNvPr>
-          <p:cNvSpPr/>
-          <p:nvPr/>
-        </p:nvSpPr>
-        <p:spPr>
-          <a:xfrm>
-            <a:off x="5213810" y="3814292"/>
-            <a:ext cx="192842" cy="192842"/>
-          </a:xfrm>
-          <a:prstGeom prst="ellipse">
-            <a:avLst/>
-          </a:prstGeom>
-        </p:spPr>
-        <p:style>
-          <a:lnRef idx="2">
-            <a:schemeClr val="dk1"/>
-          </a:lnRef>
-          <a:fillRef idx="1">
-            <a:schemeClr val="lt1"/>
-          </a:fillRef>
-          <a:effectRef idx="0">
-            <a:schemeClr val="dk1"/>
-          </a:effectRef>
-          <a:fontRef idx="minor">
-            <a:schemeClr val="dk1"/>
-          </a:fontRef>
-        </p:style>
-        <p:txBody>
-          <a:bodyPr rtlCol="0" anchor="ctr"/>
-          <a:lstStyle/>
-          <a:p>
-            <a:pPr algn="ctr"/>
-            <a:endParaRPr lang="ko-KR" altLang="en-US"/>
-          </a:p>
-        </p:txBody>
-      </p:sp>
-      <p:sp>
-        <p:nvSpPr>
-          <p:cNvPr id="22" name="직사각형 21">
-            <a:extLst>
-              <a:ext uri="{FF2B5EF4-FFF2-40B4-BE49-F238E27FC236}">
-                <a16:creationId xmlns:a16="http://schemas.microsoft.com/office/drawing/2014/main" id="{36DA6104-5927-4077-A12C-26526A5D5482}"/>
-              </a:ext>
-            </a:extLst>
-          </p:cNvPr>
-          <p:cNvSpPr/>
-          <p:nvPr/>
-        </p:nvSpPr>
-        <p:spPr>
-          <a:xfrm>
-            <a:off x="3975100" y="2604943"/>
+          <a:xfrm rot="16200000">
+            <a:off x="6019219" y="2698640"/>
             <a:ext cx="153564" cy="153564"/>
           </a:xfrm>
           <a:prstGeom prst="rect">
@@ -4146,55 +3823,37 @@
       </p:sp>
       <p:sp>
         <p:nvSpPr>
-          <p:cNvPr id="27" name="직사각형 26">
-            <a:extLst>
-              <a:ext uri="{FF2B5EF4-FFF2-40B4-BE49-F238E27FC236}">
-                <a16:creationId xmlns:a16="http://schemas.microsoft.com/office/drawing/2014/main" id="{1B715DD1-4B34-4C3C-891F-634FF5C0983C}"/>
-              </a:ext>
-            </a:extLst>
-          </p:cNvPr>
-          <p:cNvSpPr/>
+          <p:cNvPr id="35" name="TextBox 34">
+            <a:extLst>
+              <a:ext uri="{FF2B5EF4-FFF2-40B4-BE49-F238E27FC236}">
+                <a16:creationId xmlns:a16="http://schemas.microsoft.com/office/drawing/2014/main" id="{8A5B95FD-92E1-44BF-A546-5E20332E08D8}"/>
+              </a:ext>
+            </a:extLst>
+          </p:cNvPr>
+          <p:cNvSpPr txBox="1"/>
           <p:nvPr/>
         </p:nvSpPr>
         <p:spPr>
           <a:xfrm>
-            <a:off x="5229254" y="3210425"/>
-            <a:ext cx="153564" cy="153564"/>
+            <a:off x="6678678" y="2547258"/>
+            <a:ext cx="658934" cy="461665"/>
           </a:xfrm>
           <a:prstGeom prst="rect">
             <a:avLst/>
           </a:prstGeom>
-          <a:solidFill>
-            <a:schemeClr val="bg1"/>
-          </a:solidFill>
-          <a:ln>
-            <a:solidFill>
-              <a:schemeClr val="tx1"/>
-            </a:solidFill>
-          </a:ln>
+          <a:noFill/>
         </p:spPr>
-        <p:style>
-          <a:lnRef idx="2">
-            <a:schemeClr val="accent1">
-              <a:shade val="50000"/>
-            </a:schemeClr>
-          </a:lnRef>
-          <a:fillRef idx="1">
-            <a:schemeClr val="accent1"/>
-          </a:fillRef>
-          <a:effectRef idx="0">
-            <a:schemeClr val="accent1"/>
-          </a:effectRef>
-          <a:fontRef idx="minor">
-            <a:schemeClr val="lt1"/>
-          </a:fontRef>
-        </p:style>
-        <p:txBody>
-          <a:bodyPr rtlCol="0" anchor="ctr"/>
-          <a:lstStyle/>
-          <a:p>
-            <a:pPr algn="ctr"/>
-            <a:endParaRPr lang="ko-KR" altLang="en-US"/>
+        <p:txBody>
+          <a:bodyPr wrap="square" rtlCol="0">
+            <a:spAutoFit/>
+          </a:bodyPr>
+          <a:lstStyle/>
+          <a:p>
+            <a:r>
+              <a:rPr lang="en-US" altLang="ko-KR" sz="1200" dirty="0"/>
+              <a:t>Data Server</a:t>
+            </a:r>
+            <a:endParaRPr lang="ko-KR" altLang="en-US" sz="1200" dirty="0"/>
           </a:p>
         </p:txBody>
       </p:sp>

</xml_diff>